<commit_message>
WORK IN PROGRESS: DOES NOT RUN
more progress on splitting into boundary classes
</commit_message>
<xml_diff>
--- a/SC2002 SCE3 Grp 2.pptx
+++ b/SC2002 SCE3 Grp 2.pptx
@@ -3576,7 +3576,7 @@
           <a:p>
             <a:r>
               <a:rPr lang="en-US" dirty="0"/>
-              <a:t>Extra features: Factory Pattern</a:t>
+              <a:t>Extra features: Pipeline Pattern</a:t>
             </a:r>
             <a:endParaRPr lang="en-MY" dirty="0"/>
           </a:p>
@@ -3610,7 +3610,7 @@
           <a:p>
             <a:r>
               <a:rPr lang="en-US" dirty="0"/>
-              <a:t>Reason: workaround wrapper, java constructors does not accept “this” as an argument</a:t>
+              <a:t>Reason: streams API naturally leads to using pipeline pattern </a:t>
             </a:r>
             <a:endParaRPr lang="en-MY" dirty="0"/>
           </a:p>
@@ -3618,10 +3618,10 @@
       </p:sp>
       <p:pic>
         <p:nvPicPr>
-          <p:cNvPr id="5" name="Picture 4">
-            <a:extLst>
-              <a:ext uri="{FF2B5EF4-FFF2-40B4-BE49-F238E27FC236}">
-                <a16:creationId xmlns:a16="http://schemas.microsoft.com/office/drawing/2014/main" id="{3B040E0D-A0E2-4125-2595-BAC31EAAFDA6}"/>
+          <p:cNvPr id="6" name="Picture 5">
+            <a:extLst>
+              <a:ext uri="{FF2B5EF4-FFF2-40B4-BE49-F238E27FC236}">
+                <a16:creationId xmlns:a16="http://schemas.microsoft.com/office/drawing/2014/main" id="{451E9E25-2F21-FFB6-00D5-E5D54632E067}"/>
               </a:ext>
             </a:extLst>
           </p:cNvPr>
@@ -3638,8 +3638,8 @@
         </p:blipFill>
         <p:spPr>
           <a:xfrm>
-            <a:off x="199103" y="1405367"/>
-            <a:ext cx="4913411" cy="1770452"/>
+            <a:off x="740904" y="1690688"/>
+            <a:ext cx="10364098" cy="2636748"/>
           </a:xfrm>
           <a:prstGeom prst="rect">
             <a:avLst/>

</xml_diff>

<commit_message>
Updated some logic made it more OOP still havent fully OOP-ed this project yet
</commit_message>
<xml_diff>
--- a/SC2002 SCE3 Grp 2.pptx
+++ b/SC2002 SCE3 Grp 2.pptx
@@ -16,8 +16,9 @@
     <p:sldId id="266" r:id="rId10"/>
     <p:sldId id="267" r:id="rId11"/>
     <p:sldId id="268" r:id="rId12"/>
-    <p:sldId id="260" r:id="rId13"/>
-    <p:sldId id="261" r:id="rId14"/>
+    <p:sldId id="269" r:id="rId13"/>
+    <p:sldId id="260" r:id="rId14"/>
+    <p:sldId id="261" r:id="rId15"/>
   </p:sldIdLst>
   <p:sldSz cx="12192000" cy="6858000"/>
   <p:notesSz cx="6858000" cy="9144000"/>
@@ -273,7 +274,7 @@
           <a:p>
             <a:fld id="{A4D64390-3A2E-4C6A-B06D-505E371C7A3C}" type="datetimeFigureOut">
               <a:rPr lang="en-MY" smtClean="0"/>
-              <a:t>13/4/2025</a:t>
+              <a:t>14/4/2025</a:t>
             </a:fld>
             <a:endParaRPr lang="en-MY"/>
           </a:p>
@@ -473,7 +474,7 @@
           <a:p>
             <a:fld id="{A4D64390-3A2E-4C6A-B06D-505E371C7A3C}" type="datetimeFigureOut">
               <a:rPr lang="en-MY" smtClean="0"/>
-              <a:t>13/4/2025</a:t>
+              <a:t>14/4/2025</a:t>
             </a:fld>
             <a:endParaRPr lang="en-MY"/>
           </a:p>
@@ -683,7 +684,7 @@
           <a:p>
             <a:fld id="{A4D64390-3A2E-4C6A-B06D-505E371C7A3C}" type="datetimeFigureOut">
               <a:rPr lang="en-MY" smtClean="0"/>
-              <a:t>13/4/2025</a:t>
+              <a:t>14/4/2025</a:t>
             </a:fld>
             <a:endParaRPr lang="en-MY"/>
           </a:p>
@@ -883,7 +884,7 @@
           <a:p>
             <a:fld id="{A4D64390-3A2E-4C6A-B06D-505E371C7A3C}" type="datetimeFigureOut">
               <a:rPr lang="en-MY" smtClean="0"/>
-              <a:t>13/4/2025</a:t>
+              <a:t>14/4/2025</a:t>
             </a:fld>
             <a:endParaRPr lang="en-MY"/>
           </a:p>
@@ -1159,7 +1160,7 @@
           <a:p>
             <a:fld id="{A4D64390-3A2E-4C6A-B06D-505E371C7A3C}" type="datetimeFigureOut">
               <a:rPr lang="en-MY" smtClean="0"/>
-              <a:t>13/4/2025</a:t>
+              <a:t>14/4/2025</a:t>
             </a:fld>
             <a:endParaRPr lang="en-MY"/>
           </a:p>
@@ -1427,7 +1428,7 @@
           <a:p>
             <a:fld id="{A4D64390-3A2E-4C6A-B06D-505E371C7A3C}" type="datetimeFigureOut">
               <a:rPr lang="en-MY" smtClean="0"/>
-              <a:t>13/4/2025</a:t>
+              <a:t>14/4/2025</a:t>
             </a:fld>
             <a:endParaRPr lang="en-MY"/>
           </a:p>
@@ -1842,7 +1843,7 @@
           <a:p>
             <a:fld id="{A4D64390-3A2E-4C6A-B06D-505E371C7A3C}" type="datetimeFigureOut">
               <a:rPr lang="en-MY" smtClean="0"/>
-              <a:t>13/4/2025</a:t>
+              <a:t>14/4/2025</a:t>
             </a:fld>
             <a:endParaRPr lang="en-MY"/>
           </a:p>
@@ -1984,7 +1985,7 @@
           <a:p>
             <a:fld id="{A4D64390-3A2E-4C6A-B06D-505E371C7A3C}" type="datetimeFigureOut">
               <a:rPr lang="en-MY" smtClean="0"/>
-              <a:t>13/4/2025</a:t>
+              <a:t>14/4/2025</a:t>
             </a:fld>
             <a:endParaRPr lang="en-MY"/>
           </a:p>
@@ -2097,7 +2098,7 @@
           <a:p>
             <a:fld id="{A4D64390-3A2E-4C6A-B06D-505E371C7A3C}" type="datetimeFigureOut">
               <a:rPr lang="en-MY" smtClean="0"/>
-              <a:t>13/4/2025</a:t>
+              <a:t>14/4/2025</a:t>
             </a:fld>
             <a:endParaRPr lang="en-MY"/>
           </a:p>
@@ -2410,7 +2411,7 @@
           <a:p>
             <a:fld id="{A4D64390-3A2E-4C6A-B06D-505E371C7A3C}" type="datetimeFigureOut">
               <a:rPr lang="en-MY" smtClean="0"/>
-              <a:t>13/4/2025</a:t>
+              <a:t>14/4/2025</a:t>
             </a:fld>
             <a:endParaRPr lang="en-MY"/>
           </a:p>
@@ -2699,7 +2700,7 @@
           <a:p>
             <a:fld id="{A4D64390-3A2E-4C6A-B06D-505E371C7A3C}" type="datetimeFigureOut">
               <a:rPr lang="en-MY" smtClean="0"/>
-              <a:t>13/4/2025</a:t>
+              <a:t>14/4/2025</a:t>
             </a:fld>
             <a:endParaRPr lang="en-MY"/>
           </a:p>
@@ -2942,7 +2943,7 @@
           <a:p>
             <a:fld id="{A4D64390-3A2E-4C6A-B06D-505E371C7A3C}" type="datetimeFigureOut">
               <a:rPr lang="en-MY" smtClean="0"/>
-              <a:t>13/4/2025</a:t>
+              <a:t>14/4/2025</a:t>
             </a:fld>
             <a:endParaRPr lang="en-MY"/>
           </a:p>
@@ -3664,6 +3665,162 @@
   <p:cSld>
     <p:spTree>
       <p:nvGrpSpPr>
+        <p:cNvPr id="1" name="">
+          <a:extLst>
+            <a:ext uri="{FF2B5EF4-FFF2-40B4-BE49-F238E27FC236}">
+              <a16:creationId xmlns:a16="http://schemas.microsoft.com/office/drawing/2014/main" id="{ABE1A582-3E56-9AB8-4DBD-D6135EC11B0F}"/>
+            </a:ext>
+          </a:extLst>
+        </p:cNvPr>
+        <p:cNvGrpSpPr/>
+        <p:nvPr/>
+      </p:nvGrpSpPr>
+      <p:grpSpPr>
+        <a:xfrm>
+          <a:off x="0" y="0"/>
+          <a:ext cx="0" cy="0"/>
+          <a:chOff x="0" y="0"/>
+          <a:chExt cx="0" cy="0"/>
+        </a:xfrm>
+      </p:grpSpPr>
+      <p:sp>
+        <p:nvSpPr>
+          <p:cNvPr id="2" name="Title 1">
+            <a:extLst>
+              <a:ext uri="{FF2B5EF4-FFF2-40B4-BE49-F238E27FC236}">
+                <a16:creationId xmlns:a16="http://schemas.microsoft.com/office/drawing/2014/main" id="{18C0D441-DEBA-1F85-AFDB-AD93C2992842}"/>
+              </a:ext>
+            </a:extLst>
+          </p:cNvPr>
+          <p:cNvSpPr>
+            <a:spLocks noGrp="1"/>
+          </p:cNvSpPr>
+          <p:nvPr>
+            <p:ph type="title"/>
+          </p:nvPr>
+        </p:nvSpPr>
+        <p:spPr/>
+        <p:txBody>
+          <a:bodyPr/>
+          <a:lstStyle/>
+          <a:p>
+            <a:r>
+              <a:rPr lang="en-US" dirty="0"/>
+              <a:t>Extra features: Model-View-Controller Pattern</a:t>
+            </a:r>
+            <a:endParaRPr lang="en-MY" dirty="0"/>
+          </a:p>
+        </p:txBody>
+      </p:sp>
+      <p:sp>
+        <p:nvSpPr>
+          <p:cNvPr id="3" name="Content Placeholder 2">
+            <a:extLst>
+              <a:ext uri="{FF2B5EF4-FFF2-40B4-BE49-F238E27FC236}">
+                <a16:creationId xmlns:a16="http://schemas.microsoft.com/office/drawing/2014/main" id="{0DB5C8CF-C878-C7B9-DD55-E0C5AA400A88}"/>
+              </a:ext>
+            </a:extLst>
+          </p:cNvPr>
+          <p:cNvSpPr>
+            <a:spLocks noGrp="1"/>
+          </p:cNvSpPr>
+          <p:nvPr>
+            <p:ph idx="1"/>
+          </p:nvPr>
+        </p:nvSpPr>
+        <p:spPr>
+          <a:xfrm>
+            <a:off x="838200" y="4965289"/>
+            <a:ext cx="10515600" cy="1641988"/>
+          </a:xfrm>
+        </p:spPr>
+        <p:txBody>
+          <a:bodyPr>
+            <a:normAutofit fontScale="62500" lnSpcReduction="20000"/>
+          </a:bodyPr>
+          <a:lstStyle/>
+          <a:p>
+            <a:r>
+              <a:rPr lang="en-US" dirty="0"/>
+              <a:t>Reason: </a:t>
+            </a:r>
+            <a:r>
+              <a:rPr lang="en-US" dirty="0" err="1"/>
+              <a:t>AssignReq</a:t>
+            </a:r>
+            <a:r>
+              <a:rPr lang="en-US" dirty="0"/>
+              <a:t>+ </a:t>
+            </a:r>
+            <a:r>
+              <a:rPr lang="en-US" dirty="0" err="1"/>
+              <a:t>AssignReqList</a:t>
+            </a:r>
+            <a:r>
+              <a:rPr lang="en-US" dirty="0"/>
+              <a:t> (Controller)</a:t>
+            </a:r>
+          </a:p>
+          <a:p>
+            <a:pPr lvl="1"/>
+            <a:r>
+              <a:rPr lang="en-US" dirty="0" err="1"/>
+              <a:t>officerAssignIO</a:t>
+            </a:r>
+            <a:r>
+              <a:rPr lang="en-US" dirty="0"/>
+              <a:t> (View)</a:t>
+            </a:r>
+          </a:p>
+          <a:p>
+            <a:pPr lvl="1"/>
+            <a:r>
+              <a:rPr lang="en-MY" dirty="0"/>
+              <a:t>Officer, projects (Model)</a:t>
+            </a:r>
+          </a:p>
+          <a:p>
+            <a:pPr lvl="1"/>
+            <a:endParaRPr lang="en-MY" dirty="0"/>
+          </a:p>
+          <a:p>
+            <a:pPr marL="0" indent="0">
+              <a:buNone/>
+            </a:pPr>
+            <a:r>
+              <a:rPr lang="en-MY" dirty="0"/>
+              <a:t>Similar parallels for Enquiries, and Housing Applications</a:t>
+            </a:r>
+          </a:p>
+          <a:p>
+            <a:pPr marL="0" indent="0">
+              <a:buNone/>
+            </a:pPr>
+            <a:r>
+              <a:rPr lang="en-MY" dirty="0"/>
+              <a:t>3x Model View Controller patterns in this case</a:t>
+            </a:r>
+          </a:p>
+        </p:txBody>
+      </p:sp>
+    </p:spTree>
+    <p:extLst>
+      <p:ext uri="{BB962C8B-B14F-4D97-AF65-F5344CB8AC3E}">
+        <p14:creationId xmlns:p14="http://schemas.microsoft.com/office/powerpoint/2010/main" val="2593437622"/>
+      </p:ext>
+    </p:extLst>
+  </p:cSld>
+  <p:clrMapOvr>
+    <a:masterClrMapping/>
+  </p:clrMapOvr>
+</p:sld>
+</file>
+
+<file path=ppt/slides/slide13.xml><?xml version="1.0" encoding="utf-8"?>
+<p:sld xmlns:a="http://schemas.openxmlformats.org/drawingml/2006/main" xmlns:r="http://schemas.openxmlformats.org/officeDocument/2006/relationships" xmlns:p="http://schemas.openxmlformats.org/presentationml/2006/main">
+  <p:cSld>
+    <p:spTree>
+      <p:nvGrpSpPr>
         <p:cNvPr id="1" name=""/>
         <p:cNvGrpSpPr/>
         <p:nvPr/>
@@ -3743,7 +3900,7 @@
 </p:sld>
 </file>
 
-<file path=ppt/slides/slide13.xml><?xml version="1.0" encoding="utf-8"?>
+<file path=ppt/slides/slide14.xml><?xml version="1.0" encoding="utf-8"?>
 <p:sld xmlns:a="http://schemas.openxmlformats.org/drawingml/2006/main" xmlns:r="http://schemas.openxmlformats.org/officeDocument/2006/relationships" xmlns:p="http://schemas.openxmlformats.org/presentationml/2006/main">
   <p:cSld>
     <p:spTree>

</xml_diff>